<commit_message>
Updates on Powerpoint and Brief
</commit_message>
<xml_diff>
--- a/Presentations/MVP/Intro MVP-JM.pptx
+++ b/Presentations/MVP/Intro MVP-JM.pptx
@@ -105,6 +105,11 @@
       </a:defRPr>
     </a:lvl9pPr>
   </p:defaultTextStyle>
+  <p:extLst>
+    <p:ext uri="{EFAFB233-063F-42B5-8137-9DF3F51BA10A}">
+      <p15:sldGuideLst xmlns:p15="http://schemas.microsoft.com/office/powerpoint/2012/main"/>
+    </p:ext>
+  </p:extLst>
 </p:presentation>
 </file>
 
@@ -3047,6 +3052,13 @@
   <p:clrMapOvr>
     <a:masterClrMapping/>
   </p:clrMapOvr>
+  <p:timing>
+    <p:tnLst>
+      <p:par>
+        <p:cTn id="1" dur="indefinite" restart="never" nodeType="tmRoot"/>
+      </p:par>
+    </p:tnLst>
+  </p:timing>
 </p:sld>
 </file>
 
@@ -3083,16 +3095,16 @@
           <a:lstStyle/>
           <a:p>
             <a:r>
-              <a:rPr lang="en-GB" smtClean="0"/>
+              <a:rPr lang="en-GB" dirty="0" smtClean="0"/>
               <a:t>Brief</a:t>
             </a:r>
-            <a:endParaRPr lang="en-GB"/>
-          </a:p>
-        </p:txBody>
-      </p:sp>
-      <p:sp>
-        <p:nvSpPr>
-          <p:cNvPr id="3" name="Content Placeholder 2"/>
+            <a:endParaRPr lang="en-GB" dirty="0"/>
+          </a:p>
+        </p:txBody>
+      </p:sp>
+      <p:sp>
+        <p:nvSpPr>
+          <p:cNvPr id="4" name="Content Placeholder 3"/>
           <p:cNvSpPr>
             <a:spLocks noGrp="1"/>
           </p:cNvSpPr>
@@ -3100,12 +3112,329 @@
             <p:ph idx="1"/>
           </p:nvPr>
         </p:nvSpPr>
-        <p:spPr/>
-        <p:txBody>
-          <a:bodyPr/>
-          <a:lstStyle/>
-          <a:p>
-            <a:endParaRPr lang="en-GB"/>
+        <p:spPr>
+          <a:xfrm>
+            <a:off x="838200" y="1825625"/>
+            <a:ext cx="10515600" cy="1511065"/>
+          </a:xfrm>
+        </p:spPr>
+        <p:txBody>
+          <a:bodyPr/>
+          <a:lstStyle/>
+          <a:p>
+            <a:r>
+              <a:rPr lang="en-GB" dirty="0" smtClean="0"/>
+              <a:t>What Genre are we using?</a:t>
+            </a:r>
+          </a:p>
+          <a:p>
+            <a:r>
+              <a:rPr lang="en-GB" dirty="0" smtClean="0"/>
+              <a:t>What Mechanic are we changing?</a:t>
+            </a:r>
+            <a:endParaRPr lang="en-GB" dirty="0"/>
+          </a:p>
+          <a:p>
+            <a:r>
+              <a:rPr lang="en-GB" dirty="0" smtClean="0"/>
+              <a:t>What are we changing the mechanic into?</a:t>
+            </a:r>
+          </a:p>
+        </p:txBody>
+      </p:sp>
+      <p:sp>
+        <p:nvSpPr>
+          <p:cNvPr id="6" name="TextBox 5"/>
+          <p:cNvSpPr txBox="1"/>
+          <p:nvPr/>
+        </p:nvSpPr>
+        <p:spPr>
+          <a:xfrm>
+            <a:off x="4916387" y="1785688"/>
+            <a:ext cx="1745672" cy="523220"/>
+          </a:xfrm>
+          <a:prstGeom prst="rect">
+            <a:avLst/>
+          </a:prstGeom>
+          <a:noFill/>
+        </p:spPr>
+        <p:txBody>
+          <a:bodyPr wrap="square" rtlCol="0">
+            <a:spAutoFit/>
+          </a:bodyPr>
+          <a:lstStyle/>
+          <a:p>
+            <a:r>
+              <a:rPr lang="en-GB" sz="2800" dirty="0" smtClean="0"/>
+              <a:t>Platformer</a:t>
+            </a:r>
+            <a:endParaRPr lang="en-GB" sz="2800" dirty="0"/>
+          </a:p>
+        </p:txBody>
+      </p:sp>
+      <p:sp>
+        <p:nvSpPr>
+          <p:cNvPr id="7" name="TextBox 6"/>
+          <p:cNvSpPr txBox="1"/>
+          <p:nvPr/>
+        </p:nvSpPr>
+        <p:spPr>
+          <a:xfrm>
+            <a:off x="5965374" y="2290250"/>
+            <a:ext cx="5257801" cy="523220"/>
+          </a:xfrm>
+          <a:prstGeom prst="rect">
+            <a:avLst/>
+          </a:prstGeom>
+          <a:noFill/>
+        </p:spPr>
+        <p:txBody>
+          <a:bodyPr wrap="square" rtlCol="0">
+            <a:spAutoFit/>
+          </a:bodyPr>
+          <a:lstStyle/>
+          <a:p>
+            <a:r>
+              <a:rPr lang="en-GB" sz="2800" dirty="0" smtClean="0"/>
+              <a:t>Control over the Player Character</a:t>
+            </a:r>
+            <a:endParaRPr lang="en-GB" sz="2800" dirty="0"/>
+          </a:p>
+        </p:txBody>
+      </p:sp>
+      <p:sp>
+        <p:nvSpPr>
+          <p:cNvPr id="8" name="TextBox 7"/>
+          <p:cNvSpPr txBox="1"/>
+          <p:nvPr/>
+        </p:nvSpPr>
+        <p:spPr>
+          <a:xfrm>
+            <a:off x="7170718" y="2798956"/>
+            <a:ext cx="3802084" cy="523220"/>
+          </a:xfrm>
+          <a:prstGeom prst="rect">
+            <a:avLst/>
+          </a:prstGeom>
+          <a:noFill/>
+        </p:spPr>
+        <p:txBody>
+          <a:bodyPr wrap="square" rtlCol="0">
+            <a:spAutoFit/>
+          </a:bodyPr>
+          <a:lstStyle/>
+          <a:p>
+            <a:r>
+              <a:rPr lang="en-GB" sz="2800" dirty="0" smtClean="0"/>
+              <a:t>Control over the levels.</a:t>
+            </a:r>
+            <a:endParaRPr lang="en-GB" sz="2800" dirty="0"/>
+          </a:p>
+        </p:txBody>
+      </p:sp>
+      <p:sp>
+        <p:nvSpPr>
+          <p:cNvPr id="9" name="Content Placeholder 3"/>
+          <p:cNvSpPr txBox="1">
+            <a:spLocks/>
+          </p:cNvSpPr>
+          <p:nvPr/>
+        </p:nvSpPr>
+        <p:spPr>
+          <a:xfrm>
+            <a:off x="838200" y="3278095"/>
+            <a:ext cx="10515600" cy="2813947"/>
+          </a:xfrm>
+          <a:prstGeom prst="rect">
+            <a:avLst/>
+          </a:prstGeom>
+        </p:spPr>
+        <p:txBody>
+          <a:bodyPr vert="horz" lIns="91440" tIns="45720" rIns="91440" bIns="45720" rtlCol="0">
+            <a:normAutofit/>
+          </a:bodyPr>
+          <a:lstStyle>
+            <a:lvl1pPr marL="228600" indent="-228600" algn="l" defTabSz="914400" rtl="0" eaLnBrk="1" latinLnBrk="0" hangingPunct="1">
+              <a:lnSpc>
+                <a:spcPct val="90000"/>
+              </a:lnSpc>
+              <a:spcBef>
+                <a:spcPts val="1000"/>
+              </a:spcBef>
+              <a:buFont typeface="Arial" panose="020B0604020202020204" pitchFamily="34" charset="0"/>
+              <a:buChar char="•"/>
+              <a:defRPr sz="2800" kern="1200">
+                <a:solidFill>
+                  <a:schemeClr val="tx1"/>
+                </a:solidFill>
+                <a:latin typeface="+mn-lt"/>
+                <a:ea typeface="+mn-ea"/>
+                <a:cs typeface="+mn-cs"/>
+              </a:defRPr>
+            </a:lvl1pPr>
+            <a:lvl2pPr marL="685800" indent="-228600" algn="l" defTabSz="914400" rtl="0" eaLnBrk="1" latinLnBrk="0" hangingPunct="1">
+              <a:lnSpc>
+                <a:spcPct val="90000"/>
+              </a:lnSpc>
+              <a:spcBef>
+                <a:spcPts val="500"/>
+              </a:spcBef>
+              <a:buFont typeface="Arial" panose="020B0604020202020204" pitchFamily="34" charset="0"/>
+              <a:buChar char="•"/>
+              <a:defRPr sz="2400" kern="1200">
+                <a:solidFill>
+                  <a:schemeClr val="tx1"/>
+                </a:solidFill>
+                <a:latin typeface="+mn-lt"/>
+                <a:ea typeface="+mn-ea"/>
+                <a:cs typeface="+mn-cs"/>
+              </a:defRPr>
+            </a:lvl2pPr>
+            <a:lvl3pPr marL="1143000" indent="-228600" algn="l" defTabSz="914400" rtl="0" eaLnBrk="1" latinLnBrk="0" hangingPunct="1">
+              <a:lnSpc>
+                <a:spcPct val="90000"/>
+              </a:lnSpc>
+              <a:spcBef>
+                <a:spcPts val="500"/>
+              </a:spcBef>
+              <a:buFont typeface="Arial" panose="020B0604020202020204" pitchFamily="34" charset="0"/>
+              <a:buChar char="•"/>
+              <a:defRPr sz="2000" kern="1200">
+                <a:solidFill>
+                  <a:schemeClr val="tx1"/>
+                </a:solidFill>
+                <a:latin typeface="+mn-lt"/>
+                <a:ea typeface="+mn-ea"/>
+                <a:cs typeface="+mn-cs"/>
+              </a:defRPr>
+            </a:lvl3pPr>
+            <a:lvl4pPr marL="1600200" indent="-228600" algn="l" defTabSz="914400" rtl="0" eaLnBrk="1" latinLnBrk="0" hangingPunct="1">
+              <a:lnSpc>
+                <a:spcPct val="90000"/>
+              </a:lnSpc>
+              <a:spcBef>
+                <a:spcPts val="500"/>
+              </a:spcBef>
+              <a:buFont typeface="Arial" panose="020B0604020202020204" pitchFamily="34" charset="0"/>
+              <a:buChar char="•"/>
+              <a:defRPr sz="1800" kern="1200">
+                <a:solidFill>
+                  <a:schemeClr val="tx1"/>
+                </a:solidFill>
+                <a:latin typeface="+mn-lt"/>
+                <a:ea typeface="+mn-ea"/>
+                <a:cs typeface="+mn-cs"/>
+              </a:defRPr>
+            </a:lvl4pPr>
+            <a:lvl5pPr marL="2057400" indent="-228600" algn="l" defTabSz="914400" rtl="0" eaLnBrk="1" latinLnBrk="0" hangingPunct="1">
+              <a:lnSpc>
+                <a:spcPct val="90000"/>
+              </a:lnSpc>
+              <a:spcBef>
+                <a:spcPts val="500"/>
+              </a:spcBef>
+              <a:buFont typeface="Arial" panose="020B0604020202020204" pitchFamily="34" charset="0"/>
+              <a:buChar char="•"/>
+              <a:defRPr sz="1800" kern="1200">
+                <a:solidFill>
+                  <a:schemeClr val="tx1"/>
+                </a:solidFill>
+                <a:latin typeface="+mn-lt"/>
+                <a:ea typeface="+mn-ea"/>
+                <a:cs typeface="+mn-cs"/>
+              </a:defRPr>
+            </a:lvl5pPr>
+            <a:lvl6pPr marL="2514600" indent="-228600" algn="l" defTabSz="914400" rtl="0" eaLnBrk="1" latinLnBrk="0" hangingPunct="1">
+              <a:lnSpc>
+                <a:spcPct val="90000"/>
+              </a:lnSpc>
+              <a:spcBef>
+                <a:spcPts val="500"/>
+              </a:spcBef>
+              <a:buFont typeface="Arial" panose="020B0604020202020204" pitchFamily="34" charset="0"/>
+              <a:buChar char="•"/>
+              <a:defRPr sz="1800" kern="1200">
+                <a:solidFill>
+                  <a:schemeClr val="tx1"/>
+                </a:solidFill>
+                <a:latin typeface="+mn-lt"/>
+                <a:ea typeface="+mn-ea"/>
+                <a:cs typeface="+mn-cs"/>
+              </a:defRPr>
+            </a:lvl6pPr>
+            <a:lvl7pPr marL="2971800" indent="-228600" algn="l" defTabSz="914400" rtl="0" eaLnBrk="1" latinLnBrk="0" hangingPunct="1">
+              <a:lnSpc>
+                <a:spcPct val="90000"/>
+              </a:lnSpc>
+              <a:spcBef>
+                <a:spcPts val="500"/>
+              </a:spcBef>
+              <a:buFont typeface="Arial" panose="020B0604020202020204" pitchFamily="34" charset="0"/>
+              <a:buChar char="•"/>
+              <a:defRPr sz="1800" kern="1200">
+                <a:solidFill>
+                  <a:schemeClr val="tx1"/>
+                </a:solidFill>
+                <a:latin typeface="+mn-lt"/>
+                <a:ea typeface="+mn-ea"/>
+                <a:cs typeface="+mn-cs"/>
+              </a:defRPr>
+            </a:lvl7pPr>
+            <a:lvl8pPr marL="3429000" indent="-228600" algn="l" defTabSz="914400" rtl="0" eaLnBrk="1" latinLnBrk="0" hangingPunct="1">
+              <a:lnSpc>
+                <a:spcPct val="90000"/>
+              </a:lnSpc>
+              <a:spcBef>
+                <a:spcPts val="500"/>
+              </a:spcBef>
+              <a:buFont typeface="Arial" panose="020B0604020202020204" pitchFamily="34" charset="0"/>
+              <a:buChar char="•"/>
+              <a:defRPr sz="1800" kern="1200">
+                <a:solidFill>
+                  <a:schemeClr val="tx1"/>
+                </a:solidFill>
+                <a:latin typeface="+mn-lt"/>
+                <a:ea typeface="+mn-ea"/>
+                <a:cs typeface="+mn-cs"/>
+              </a:defRPr>
+            </a:lvl8pPr>
+            <a:lvl9pPr marL="3886200" indent="-228600" algn="l" defTabSz="914400" rtl="0" eaLnBrk="1" latinLnBrk="0" hangingPunct="1">
+              <a:lnSpc>
+                <a:spcPct val="90000"/>
+              </a:lnSpc>
+              <a:spcBef>
+                <a:spcPts val="500"/>
+              </a:spcBef>
+              <a:buFont typeface="Arial" panose="020B0604020202020204" pitchFamily="34" charset="0"/>
+              <a:buChar char="•"/>
+              <a:defRPr sz="1800" kern="1200">
+                <a:solidFill>
+                  <a:schemeClr val="tx1"/>
+                </a:solidFill>
+                <a:latin typeface="+mn-lt"/>
+                <a:ea typeface="+mn-ea"/>
+                <a:cs typeface="+mn-cs"/>
+              </a:defRPr>
+            </a:lvl9pPr>
+          </a:lstStyle>
+          <a:p>
+            <a:r>
+              <a:rPr lang="en-GB" dirty="0" smtClean="0"/>
+              <a:t>What emotions are we looking for?</a:t>
+            </a:r>
+          </a:p>
+          <a:p>
+            <a:r>
+              <a:rPr lang="en-GB" dirty="0" smtClean="0"/>
+              <a:t>What are the Key Design problems we will face?</a:t>
+            </a:r>
+          </a:p>
+          <a:p>
+            <a:r>
+              <a:rPr lang="en-GB" dirty="0" smtClean="0"/>
+              <a:t>What are the Key Programming issues we will have?</a:t>
+            </a:r>
+            <a:endParaRPr lang="en-GB" dirty="0" smtClean="0"/>
           </a:p>
         </p:txBody>
       </p:sp>
@@ -3119,6 +3448,715 @@
   <p:clrMapOvr>
     <a:masterClrMapping/>
   </p:clrMapOvr>
+  <p:timing>
+    <p:tnLst>
+      <p:par>
+        <p:cTn id="1" dur="indefinite" restart="never" nodeType="tmRoot">
+          <p:childTnLst>
+            <p:seq concurrent="1" nextAc="seek">
+              <p:cTn id="2" dur="indefinite" nodeType="mainSeq">
+                <p:childTnLst>
+                  <p:par>
+                    <p:cTn id="3" fill="hold">
+                      <p:stCondLst>
+                        <p:cond delay="indefinite"/>
+                      </p:stCondLst>
+                      <p:childTnLst>
+                        <p:par>
+                          <p:cTn id="4" fill="hold">
+                            <p:stCondLst>
+                              <p:cond delay="0"/>
+                            </p:stCondLst>
+                            <p:childTnLst>
+                              <p:par>
+                                <p:cTn id="5" presetID="10" presetClass="entr" presetSubtype="0" fill="hold" grpId="0" nodeType="clickEffect">
+                                  <p:stCondLst>
+                                    <p:cond delay="0"/>
+                                  </p:stCondLst>
+                                  <p:childTnLst>
+                                    <p:set>
+                                      <p:cBhvr>
+                                        <p:cTn id="6" dur="1" fill="hold">
+                                          <p:stCondLst>
+                                            <p:cond delay="0"/>
+                                          </p:stCondLst>
+                                        </p:cTn>
+                                        <p:tgtEl>
+                                          <p:spTgt spid="4">
+                                            <p:txEl>
+                                              <p:pRg st="0" end="0"/>
+                                            </p:txEl>
+                                          </p:spTgt>
+                                        </p:tgtEl>
+                                        <p:attrNameLst>
+                                          <p:attrName>style.visibility</p:attrName>
+                                        </p:attrNameLst>
+                                      </p:cBhvr>
+                                      <p:to>
+                                        <p:strVal val="visible"/>
+                                      </p:to>
+                                    </p:set>
+                                    <p:animEffect transition="in" filter="fade">
+                                      <p:cBhvr>
+                                        <p:cTn id="7" dur="500"/>
+                                        <p:tgtEl>
+                                          <p:spTgt spid="4">
+                                            <p:txEl>
+                                              <p:pRg st="0" end="0"/>
+                                            </p:txEl>
+                                          </p:spTgt>
+                                        </p:tgtEl>
+                                      </p:cBhvr>
+                                    </p:animEffect>
+                                  </p:childTnLst>
+                                </p:cTn>
+                              </p:par>
+                            </p:childTnLst>
+                          </p:cTn>
+                        </p:par>
+                      </p:childTnLst>
+                    </p:cTn>
+                  </p:par>
+                  <p:par>
+                    <p:cTn id="8" fill="hold">
+                      <p:stCondLst>
+                        <p:cond delay="indefinite"/>
+                      </p:stCondLst>
+                      <p:childTnLst>
+                        <p:par>
+                          <p:cTn id="9" fill="hold">
+                            <p:stCondLst>
+                              <p:cond delay="0"/>
+                            </p:stCondLst>
+                            <p:childTnLst>
+                              <p:par>
+                                <p:cTn id="10" presetID="10" presetClass="entr" presetSubtype="0" fill="hold" grpId="0" nodeType="clickEffect">
+                                  <p:stCondLst>
+                                    <p:cond delay="0"/>
+                                  </p:stCondLst>
+                                  <p:childTnLst>
+                                    <p:set>
+                                      <p:cBhvr>
+                                        <p:cTn id="11" dur="1" fill="hold">
+                                          <p:stCondLst>
+                                            <p:cond delay="0"/>
+                                          </p:stCondLst>
+                                        </p:cTn>
+                                        <p:tgtEl>
+                                          <p:spTgt spid="4">
+                                            <p:txEl>
+                                              <p:pRg st="1" end="1"/>
+                                            </p:txEl>
+                                          </p:spTgt>
+                                        </p:tgtEl>
+                                        <p:attrNameLst>
+                                          <p:attrName>style.visibility</p:attrName>
+                                        </p:attrNameLst>
+                                      </p:cBhvr>
+                                      <p:to>
+                                        <p:strVal val="visible"/>
+                                      </p:to>
+                                    </p:set>
+                                    <p:animEffect transition="in" filter="fade">
+                                      <p:cBhvr>
+                                        <p:cTn id="12" dur="500"/>
+                                        <p:tgtEl>
+                                          <p:spTgt spid="4">
+                                            <p:txEl>
+                                              <p:pRg st="1" end="1"/>
+                                            </p:txEl>
+                                          </p:spTgt>
+                                        </p:tgtEl>
+                                      </p:cBhvr>
+                                    </p:animEffect>
+                                  </p:childTnLst>
+                                </p:cTn>
+                              </p:par>
+                            </p:childTnLst>
+                          </p:cTn>
+                        </p:par>
+                      </p:childTnLst>
+                    </p:cTn>
+                  </p:par>
+                  <p:par>
+                    <p:cTn id="13" fill="hold">
+                      <p:stCondLst>
+                        <p:cond delay="indefinite"/>
+                      </p:stCondLst>
+                      <p:childTnLst>
+                        <p:par>
+                          <p:cTn id="14" fill="hold">
+                            <p:stCondLst>
+                              <p:cond delay="0"/>
+                            </p:stCondLst>
+                            <p:childTnLst>
+                              <p:par>
+                                <p:cTn id="15" presetID="10" presetClass="entr" presetSubtype="0" fill="hold" grpId="0" nodeType="clickEffect">
+                                  <p:stCondLst>
+                                    <p:cond delay="0"/>
+                                  </p:stCondLst>
+                                  <p:childTnLst>
+                                    <p:set>
+                                      <p:cBhvr>
+                                        <p:cTn id="16" dur="1" fill="hold">
+                                          <p:stCondLst>
+                                            <p:cond delay="0"/>
+                                          </p:stCondLst>
+                                        </p:cTn>
+                                        <p:tgtEl>
+                                          <p:spTgt spid="4">
+                                            <p:txEl>
+                                              <p:pRg st="2" end="2"/>
+                                            </p:txEl>
+                                          </p:spTgt>
+                                        </p:tgtEl>
+                                        <p:attrNameLst>
+                                          <p:attrName>style.visibility</p:attrName>
+                                        </p:attrNameLst>
+                                      </p:cBhvr>
+                                      <p:to>
+                                        <p:strVal val="visible"/>
+                                      </p:to>
+                                    </p:set>
+                                    <p:animEffect transition="in" filter="fade">
+                                      <p:cBhvr>
+                                        <p:cTn id="17" dur="500"/>
+                                        <p:tgtEl>
+                                          <p:spTgt spid="4">
+                                            <p:txEl>
+                                              <p:pRg st="2" end="2"/>
+                                            </p:txEl>
+                                          </p:spTgt>
+                                        </p:tgtEl>
+                                      </p:cBhvr>
+                                    </p:animEffect>
+                                  </p:childTnLst>
+                                </p:cTn>
+                              </p:par>
+                            </p:childTnLst>
+                          </p:cTn>
+                        </p:par>
+                      </p:childTnLst>
+                    </p:cTn>
+                  </p:par>
+                  <p:par>
+                    <p:cTn id="18" fill="hold">
+                      <p:stCondLst>
+                        <p:cond delay="indefinite"/>
+                      </p:stCondLst>
+                      <p:childTnLst>
+                        <p:par>
+                          <p:cTn id="19" fill="hold">
+                            <p:stCondLst>
+                              <p:cond delay="0"/>
+                            </p:stCondLst>
+                            <p:childTnLst>
+                              <p:par>
+                                <p:cTn id="20" presetID="10" presetClass="entr" presetSubtype="0" fill="hold" nodeType="clickEffect">
+                                  <p:stCondLst>
+                                    <p:cond delay="0"/>
+                                  </p:stCondLst>
+                                  <p:childTnLst>
+                                    <p:set>
+                                      <p:cBhvr>
+                                        <p:cTn id="21" dur="1" fill="hold">
+                                          <p:stCondLst>
+                                            <p:cond delay="0"/>
+                                          </p:stCondLst>
+                                        </p:cTn>
+                                        <p:tgtEl>
+                                          <p:spTgt spid="9">
+                                            <p:txEl>
+                                              <p:pRg st="0" end="0"/>
+                                            </p:txEl>
+                                          </p:spTgt>
+                                        </p:tgtEl>
+                                        <p:attrNameLst>
+                                          <p:attrName>style.visibility</p:attrName>
+                                        </p:attrNameLst>
+                                      </p:cBhvr>
+                                      <p:to>
+                                        <p:strVal val="visible"/>
+                                      </p:to>
+                                    </p:set>
+                                    <p:animEffect transition="in" filter="fade">
+                                      <p:cBhvr>
+                                        <p:cTn id="22" dur="500"/>
+                                        <p:tgtEl>
+                                          <p:spTgt spid="9">
+                                            <p:txEl>
+                                              <p:pRg st="0" end="0"/>
+                                            </p:txEl>
+                                          </p:spTgt>
+                                        </p:tgtEl>
+                                      </p:cBhvr>
+                                    </p:animEffect>
+                                  </p:childTnLst>
+                                </p:cTn>
+                              </p:par>
+                            </p:childTnLst>
+                          </p:cTn>
+                        </p:par>
+                      </p:childTnLst>
+                    </p:cTn>
+                  </p:par>
+                  <p:par>
+                    <p:cTn id="23" fill="hold">
+                      <p:stCondLst>
+                        <p:cond delay="indefinite"/>
+                      </p:stCondLst>
+                      <p:childTnLst>
+                        <p:par>
+                          <p:cTn id="24" fill="hold">
+                            <p:stCondLst>
+                              <p:cond delay="0"/>
+                            </p:stCondLst>
+                            <p:childTnLst>
+                              <p:par>
+                                <p:cTn id="25" presetID="10" presetClass="entr" presetSubtype="0" fill="hold" nodeType="clickEffect">
+                                  <p:stCondLst>
+                                    <p:cond delay="0"/>
+                                  </p:stCondLst>
+                                  <p:childTnLst>
+                                    <p:set>
+                                      <p:cBhvr>
+                                        <p:cTn id="26" dur="1" fill="hold">
+                                          <p:stCondLst>
+                                            <p:cond delay="0"/>
+                                          </p:stCondLst>
+                                        </p:cTn>
+                                        <p:tgtEl>
+                                          <p:spTgt spid="9">
+                                            <p:txEl>
+                                              <p:pRg st="1" end="1"/>
+                                            </p:txEl>
+                                          </p:spTgt>
+                                        </p:tgtEl>
+                                        <p:attrNameLst>
+                                          <p:attrName>style.visibility</p:attrName>
+                                        </p:attrNameLst>
+                                      </p:cBhvr>
+                                      <p:to>
+                                        <p:strVal val="visible"/>
+                                      </p:to>
+                                    </p:set>
+                                    <p:animEffect transition="in" filter="fade">
+                                      <p:cBhvr>
+                                        <p:cTn id="27" dur="500"/>
+                                        <p:tgtEl>
+                                          <p:spTgt spid="9">
+                                            <p:txEl>
+                                              <p:pRg st="1" end="1"/>
+                                            </p:txEl>
+                                          </p:spTgt>
+                                        </p:tgtEl>
+                                      </p:cBhvr>
+                                    </p:animEffect>
+                                  </p:childTnLst>
+                                </p:cTn>
+                              </p:par>
+                            </p:childTnLst>
+                          </p:cTn>
+                        </p:par>
+                      </p:childTnLst>
+                    </p:cTn>
+                  </p:par>
+                  <p:par>
+                    <p:cTn id="28" fill="hold">
+                      <p:stCondLst>
+                        <p:cond delay="indefinite"/>
+                      </p:stCondLst>
+                      <p:childTnLst>
+                        <p:par>
+                          <p:cTn id="29" fill="hold">
+                            <p:stCondLst>
+                              <p:cond delay="0"/>
+                            </p:stCondLst>
+                            <p:childTnLst>
+                              <p:par>
+                                <p:cTn id="30" presetID="10" presetClass="entr" presetSubtype="0" fill="hold" nodeType="clickEffect">
+                                  <p:stCondLst>
+                                    <p:cond delay="0"/>
+                                  </p:stCondLst>
+                                  <p:childTnLst>
+                                    <p:set>
+                                      <p:cBhvr>
+                                        <p:cTn id="31" dur="1" fill="hold">
+                                          <p:stCondLst>
+                                            <p:cond delay="0"/>
+                                          </p:stCondLst>
+                                        </p:cTn>
+                                        <p:tgtEl>
+                                          <p:spTgt spid="9">
+                                            <p:txEl>
+                                              <p:pRg st="2" end="2"/>
+                                            </p:txEl>
+                                          </p:spTgt>
+                                        </p:tgtEl>
+                                        <p:attrNameLst>
+                                          <p:attrName>style.visibility</p:attrName>
+                                        </p:attrNameLst>
+                                      </p:cBhvr>
+                                      <p:to>
+                                        <p:strVal val="visible"/>
+                                      </p:to>
+                                    </p:set>
+                                    <p:animEffect transition="in" filter="fade">
+                                      <p:cBhvr>
+                                        <p:cTn id="32" dur="500"/>
+                                        <p:tgtEl>
+                                          <p:spTgt spid="9">
+                                            <p:txEl>
+                                              <p:pRg st="2" end="2"/>
+                                            </p:txEl>
+                                          </p:spTgt>
+                                        </p:tgtEl>
+                                      </p:cBhvr>
+                                    </p:animEffect>
+                                  </p:childTnLst>
+                                </p:cTn>
+                              </p:par>
+                            </p:childTnLst>
+                          </p:cTn>
+                        </p:par>
+                      </p:childTnLst>
+                    </p:cTn>
+                  </p:par>
+                  <p:par>
+                    <p:cTn id="33" fill="hold">
+                      <p:stCondLst>
+                        <p:cond delay="indefinite"/>
+                      </p:stCondLst>
+                      <p:childTnLst>
+                        <p:par>
+                          <p:cTn id="34" fill="hold">
+                            <p:stCondLst>
+                              <p:cond delay="0"/>
+                            </p:stCondLst>
+                            <p:childTnLst>
+                              <p:par>
+                                <p:cTn id="35" presetID="10" presetClass="exit" presetSubtype="0" fill="hold" grpId="1" nodeType="clickEffect">
+                                  <p:stCondLst>
+                                    <p:cond delay="0"/>
+                                  </p:stCondLst>
+                                  <p:childTnLst>
+                                    <p:animEffect transition="out" filter="fade">
+                                      <p:cBhvr>
+                                        <p:cTn id="36" dur="500"/>
+                                        <p:tgtEl>
+                                          <p:spTgt spid="9">
+                                            <p:txEl>
+                                              <p:pRg st="0" end="0"/>
+                                            </p:txEl>
+                                          </p:spTgt>
+                                        </p:tgtEl>
+                                      </p:cBhvr>
+                                    </p:animEffect>
+                                    <p:set>
+                                      <p:cBhvr>
+                                        <p:cTn id="37" dur="1" fill="hold">
+                                          <p:stCondLst>
+                                            <p:cond delay="499"/>
+                                          </p:stCondLst>
+                                        </p:cTn>
+                                        <p:tgtEl>
+                                          <p:spTgt spid="9">
+                                            <p:txEl>
+                                              <p:pRg st="0" end="0"/>
+                                            </p:txEl>
+                                          </p:spTgt>
+                                        </p:tgtEl>
+                                        <p:attrNameLst>
+                                          <p:attrName>style.visibility</p:attrName>
+                                        </p:attrNameLst>
+                                      </p:cBhvr>
+                                      <p:to>
+                                        <p:strVal val="hidden"/>
+                                      </p:to>
+                                    </p:set>
+                                  </p:childTnLst>
+                                </p:cTn>
+                              </p:par>
+                              <p:par>
+                                <p:cTn id="38" presetID="10" presetClass="exit" presetSubtype="0" fill="hold" grpId="1" nodeType="withEffect">
+                                  <p:stCondLst>
+                                    <p:cond delay="0"/>
+                                  </p:stCondLst>
+                                  <p:childTnLst>
+                                    <p:animEffect transition="out" filter="fade">
+                                      <p:cBhvr>
+                                        <p:cTn id="39" dur="500"/>
+                                        <p:tgtEl>
+                                          <p:spTgt spid="9">
+                                            <p:txEl>
+                                              <p:pRg st="1" end="1"/>
+                                            </p:txEl>
+                                          </p:spTgt>
+                                        </p:tgtEl>
+                                      </p:cBhvr>
+                                    </p:animEffect>
+                                    <p:set>
+                                      <p:cBhvr>
+                                        <p:cTn id="40" dur="1" fill="hold">
+                                          <p:stCondLst>
+                                            <p:cond delay="499"/>
+                                          </p:stCondLst>
+                                        </p:cTn>
+                                        <p:tgtEl>
+                                          <p:spTgt spid="9">
+                                            <p:txEl>
+                                              <p:pRg st="1" end="1"/>
+                                            </p:txEl>
+                                          </p:spTgt>
+                                        </p:tgtEl>
+                                        <p:attrNameLst>
+                                          <p:attrName>style.visibility</p:attrName>
+                                        </p:attrNameLst>
+                                      </p:cBhvr>
+                                      <p:to>
+                                        <p:strVal val="hidden"/>
+                                      </p:to>
+                                    </p:set>
+                                  </p:childTnLst>
+                                </p:cTn>
+                              </p:par>
+                              <p:par>
+                                <p:cTn id="41" presetID="10" presetClass="exit" presetSubtype="0" fill="hold" grpId="1" nodeType="withEffect">
+                                  <p:stCondLst>
+                                    <p:cond delay="0"/>
+                                  </p:stCondLst>
+                                  <p:childTnLst>
+                                    <p:animEffect transition="out" filter="fade">
+                                      <p:cBhvr>
+                                        <p:cTn id="42" dur="500"/>
+                                        <p:tgtEl>
+                                          <p:spTgt spid="9">
+                                            <p:txEl>
+                                              <p:pRg st="2" end="2"/>
+                                            </p:txEl>
+                                          </p:spTgt>
+                                        </p:tgtEl>
+                                      </p:cBhvr>
+                                    </p:animEffect>
+                                    <p:set>
+                                      <p:cBhvr>
+                                        <p:cTn id="43" dur="1" fill="hold">
+                                          <p:stCondLst>
+                                            <p:cond delay="499"/>
+                                          </p:stCondLst>
+                                        </p:cTn>
+                                        <p:tgtEl>
+                                          <p:spTgt spid="9">
+                                            <p:txEl>
+                                              <p:pRg st="2" end="2"/>
+                                            </p:txEl>
+                                          </p:spTgt>
+                                        </p:tgtEl>
+                                        <p:attrNameLst>
+                                          <p:attrName>style.visibility</p:attrName>
+                                        </p:attrNameLst>
+                                      </p:cBhvr>
+                                      <p:to>
+                                        <p:strVal val="hidden"/>
+                                      </p:to>
+                                    </p:set>
+                                  </p:childTnLst>
+                                </p:cTn>
+                              </p:par>
+                            </p:childTnLst>
+                          </p:cTn>
+                        </p:par>
+                      </p:childTnLst>
+                    </p:cTn>
+                  </p:par>
+                  <p:par>
+                    <p:cTn id="44" fill="hold">
+                      <p:stCondLst>
+                        <p:cond delay="indefinite"/>
+                      </p:stCondLst>
+                      <p:childTnLst>
+                        <p:par>
+                          <p:cTn id="45" fill="hold">
+                            <p:stCondLst>
+                              <p:cond delay="0"/>
+                            </p:stCondLst>
+                            <p:childTnLst>
+                              <p:par>
+                                <p:cTn id="46" presetID="10" presetClass="entr" presetSubtype="0" fill="hold" grpId="0" nodeType="clickEffect">
+                                  <p:stCondLst>
+                                    <p:cond delay="0"/>
+                                  </p:stCondLst>
+                                  <p:childTnLst>
+                                    <p:set>
+                                      <p:cBhvr>
+                                        <p:cTn id="47" dur="1" fill="hold">
+                                          <p:stCondLst>
+                                            <p:cond delay="0"/>
+                                          </p:stCondLst>
+                                        </p:cTn>
+                                        <p:tgtEl>
+                                          <p:spTgt spid="6"/>
+                                        </p:tgtEl>
+                                        <p:attrNameLst>
+                                          <p:attrName>style.visibility</p:attrName>
+                                        </p:attrNameLst>
+                                      </p:cBhvr>
+                                      <p:to>
+                                        <p:strVal val="visible"/>
+                                      </p:to>
+                                    </p:set>
+                                    <p:animEffect transition="in" filter="fade">
+                                      <p:cBhvr>
+                                        <p:cTn id="48" dur="500"/>
+                                        <p:tgtEl>
+                                          <p:spTgt spid="6"/>
+                                        </p:tgtEl>
+                                      </p:cBhvr>
+                                    </p:animEffect>
+                                  </p:childTnLst>
+                                </p:cTn>
+                              </p:par>
+                            </p:childTnLst>
+                          </p:cTn>
+                        </p:par>
+                      </p:childTnLst>
+                    </p:cTn>
+                  </p:par>
+                  <p:par>
+                    <p:cTn id="49" fill="hold">
+                      <p:stCondLst>
+                        <p:cond delay="indefinite"/>
+                      </p:stCondLst>
+                      <p:childTnLst>
+                        <p:par>
+                          <p:cTn id="50" fill="hold">
+                            <p:stCondLst>
+                              <p:cond delay="0"/>
+                            </p:stCondLst>
+                            <p:childTnLst>
+                              <p:par>
+                                <p:cTn id="51" presetID="10" presetClass="entr" presetSubtype="0" fill="hold" grpId="0" nodeType="clickEffect">
+                                  <p:stCondLst>
+                                    <p:cond delay="0"/>
+                                  </p:stCondLst>
+                                  <p:childTnLst>
+                                    <p:set>
+                                      <p:cBhvr>
+                                        <p:cTn id="52" dur="1" fill="hold">
+                                          <p:stCondLst>
+                                            <p:cond delay="0"/>
+                                          </p:stCondLst>
+                                        </p:cTn>
+                                        <p:tgtEl>
+                                          <p:spTgt spid="7"/>
+                                        </p:tgtEl>
+                                        <p:attrNameLst>
+                                          <p:attrName>style.visibility</p:attrName>
+                                        </p:attrNameLst>
+                                      </p:cBhvr>
+                                      <p:to>
+                                        <p:strVal val="visible"/>
+                                      </p:to>
+                                    </p:set>
+                                    <p:animEffect transition="in" filter="fade">
+                                      <p:cBhvr>
+                                        <p:cTn id="53" dur="500"/>
+                                        <p:tgtEl>
+                                          <p:spTgt spid="7"/>
+                                        </p:tgtEl>
+                                      </p:cBhvr>
+                                    </p:animEffect>
+                                  </p:childTnLst>
+                                </p:cTn>
+                              </p:par>
+                            </p:childTnLst>
+                          </p:cTn>
+                        </p:par>
+                      </p:childTnLst>
+                    </p:cTn>
+                  </p:par>
+                  <p:par>
+                    <p:cTn id="54" fill="hold">
+                      <p:stCondLst>
+                        <p:cond delay="indefinite"/>
+                      </p:stCondLst>
+                      <p:childTnLst>
+                        <p:par>
+                          <p:cTn id="55" fill="hold">
+                            <p:stCondLst>
+                              <p:cond delay="0"/>
+                            </p:stCondLst>
+                            <p:childTnLst>
+                              <p:par>
+                                <p:cTn id="56" presetID="10" presetClass="entr" presetSubtype="0" fill="hold" grpId="0" nodeType="clickEffect">
+                                  <p:stCondLst>
+                                    <p:cond delay="0"/>
+                                  </p:stCondLst>
+                                  <p:childTnLst>
+                                    <p:set>
+                                      <p:cBhvr>
+                                        <p:cTn id="57" dur="1" fill="hold">
+                                          <p:stCondLst>
+                                            <p:cond delay="0"/>
+                                          </p:stCondLst>
+                                        </p:cTn>
+                                        <p:tgtEl>
+                                          <p:spTgt spid="8"/>
+                                        </p:tgtEl>
+                                        <p:attrNameLst>
+                                          <p:attrName>style.visibility</p:attrName>
+                                        </p:attrNameLst>
+                                      </p:cBhvr>
+                                      <p:to>
+                                        <p:strVal val="visible"/>
+                                      </p:to>
+                                    </p:set>
+                                    <p:animEffect transition="in" filter="fade">
+                                      <p:cBhvr>
+                                        <p:cTn id="58" dur="500"/>
+                                        <p:tgtEl>
+                                          <p:spTgt spid="8"/>
+                                        </p:tgtEl>
+                                      </p:cBhvr>
+                                    </p:animEffect>
+                                  </p:childTnLst>
+                                </p:cTn>
+                              </p:par>
+                            </p:childTnLst>
+                          </p:cTn>
+                        </p:par>
+                      </p:childTnLst>
+                    </p:cTn>
+                  </p:par>
+                </p:childTnLst>
+              </p:cTn>
+              <p:prevCondLst>
+                <p:cond evt="onPrev" delay="0">
+                  <p:tgtEl>
+                    <p:sldTgt/>
+                  </p:tgtEl>
+                </p:cond>
+              </p:prevCondLst>
+              <p:nextCondLst>
+                <p:cond evt="onNext" delay="0">
+                  <p:tgtEl>
+                    <p:sldTgt/>
+                  </p:tgtEl>
+                </p:cond>
+              </p:nextCondLst>
+            </p:seq>
+          </p:childTnLst>
+        </p:cTn>
+      </p:par>
+    </p:tnLst>
+    <p:bldLst>
+      <p:bldP spid="4" grpId="0" build="p"/>
+      <p:bldP spid="6" grpId="0"/>
+      <p:bldP spid="7" grpId="0"/>
+      <p:bldP spid="8" grpId="0"/>
+      <p:bldP spid="9" grpId="1" build="allAtOnce"/>
+    </p:bldLst>
+  </p:timing>
 </p:sld>
 </file>
 

</xml_diff>